<commit_message>
update ppt for cLHS example
update ppt for cLHS example
</commit_message>
<xml_diff>
--- a/presentations/sampling/cLHS_sampling_R_example.pptx
+++ b/presentations/sampling/cLHS_sampling_R_example.pptx
@@ -5,7 +5,7 @@
     <p:sldMasterId id="2147483648" r:id="rId1"/>
   </p:sldMasterIdLst>
   <p:notesMasterIdLst>
-    <p:notesMasterId r:id="rId21"/>
+    <p:notesMasterId r:id="rId19"/>
   </p:notesMasterIdLst>
   <p:sldIdLst>
     <p:sldId id="281" r:id="rId2"/>
@@ -25,13 +25,11 @@
     <p:sldId id="292" r:id="rId16"/>
     <p:sldId id="291" r:id="rId17"/>
     <p:sldId id="298" r:id="rId18"/>
-    <p:sldId id="301" r:id="rId19"/>
-    <p:sldId id="302" r:id="rId20"/>
   </p:sldIdLst>
   <p:sldSz cx="9144000" cy="6858000" type="screen4x3"/>
   <p:notesSz cx="6858000" cy="9144000"/>
   <p:custDataLst>
-    <p:tags r:id="rId22"/>
+    <p:tags r:id="rId20"/>
   </p:custDataLst>
   <p:defaultTextStyle>
     <a:defPPr>
@@ -230,7 +228,7 @@
             <a:fld id="{333390A1-EFA7-4975-B307-3ED18211B739}" type="datetimeFigureOut">
               <a:rPr lang="en-US" smtClean="0"/>
               <a:pPr/>
-              <a:t>1/26/2016</a:t>
+              <a:t>2/11/2016</a:t>
             </a:fld>
             <a:endParaRPr lang="en-US"/>
           </a:p>
@@ -689,7 +687,7 @@
             <a:fld id="{1F541AB0-5ECD-4F0C-8435-DFC39302280B}" type="datetimeFigureOut">
               <a:rPr lang="en-US" smtClean="0"/>
               <a:pPr/>
-              <a:t>1/26/2016</a:t>
+              <a:t>2/11/2016</a:t>
             </a:fld>
             <a:endParaRPr lang="en-US"/>
           </a:p>
@@ -861,7 +859,7 @@
             <a:fld id="{1F541AB0-5ECD-4F0C-8435-DFC39302280B}" type="datetimeFigureOut">
               <a:rPr lang="en-US" smtClean="0"/>
               <a:pPr/>
-              <a:t>1/26/2016</a:t>
+              <a:t>2/11/2016</a:t>
             </a:fld>
             <a:endParaRPr lang="en-US"/>
           </a:p>
@@ -1043,7 +1041,7 @@
             <a:fld id="{1F541AB0-5ECD-4F0C-8435-DFC39302280B}" type="datetimeFigureOut">
               <a:rPr lang="en-US" smtClean="0"/>
               <a:pPr/>
-              <a:t>1/26/2016</a:t>
+              <a:t>2/11/2016</a:t>
             </a:fld>
             <a:endParaRPr lang="en-US"/>
           </a:p>
@@ -1215,7 +1213,7 @@
             <a:fld id="{1F541AB0-5ECD-4F0C-8435-DFC39302280B}" type="datetimeFigureOut">
               <a:rPr lang="en-US" smtClean="0"/>
               <a:pPr/>
-              <a:t>1/26/2016</a:t>
+              <a:t>2/11/2016</a:t>
             </a:fld>
             <a:endParaRPr lang="en-US"/>
           </a:p>
@@ -1463,7 +1461,7 @@
             <a:fld id="{1F541AB0-5ECD-4F0C-8435-DFC39302280B}" type="datetimeFigureOut">
               <a:rPr lang="en-US" smtClean="0"/>
               <a:pPr/>
-              <a:t>1/26/2016</a:t>
+              <a:t>2/11/2016</a:t>
             </a:fld>
             <a:endParaRPr lang="en-US"/>
           </a:p>
@@ -1753,7 +1751,7 @@
             <a:fld id="{1F541AB0-5ECD-4F0C-8435-DFC39302280B}" type="datetimeFigureOut">
               <a:rPr lang="en-US" smtClean="0"/>
               <a:pPr/>
-              <a:t>1/26/2016</a:t>
+              <a:t>2/11/2016</a:t>
             </a:fld>
             <a:endParaRPr lang="en-US"/>
           </a:p>
@@ -2177,7 +2175,7 @@
             <a:fld id="{1F541AB0-5ECD-4F0C-8435-DFC39302280B}" type="datetimeFigureOut">
               <a:rPr lang="en-US" smtClean="0"/>
               <a:pPr/>
-              <a:t>1/26/2016</a:t>
+              <a:t>2/11/2016</a:t>
             </a:fld>
             <a:endParaRPr lang="en-US"/>
           </a:p>
@@ -2297,7 +2295,7 @@
             <a:fld id="{1F541AB0-5ECD-4F0C-8435-DFC39302280B}" type="datetimeFigureOut">
               <a:rPr lang="en-US" smtClean="0"/>
               <a:pPr/>
-              <a:t>1/26/2016</a:t>
+              <a:t>2/11/2016</a:t>
             </a:fld>
             <a:endParaRPr lang="en-US"/>
           </a:p>
@@ -2394,7 +2392,7 @@
             <a:fld id="{1F541AB0-5ECD-4F0C-8435-DFC39302280B}" type="datetimeFigureOut">
               <a:rPr lang="en-US" smtClean="0"/>
               <a:pPr/>
-              <a:t>1/26/2016</a:t>
+              <a:t>2/11/2016</a:t>
             </a:fld>
             <a:endParaRPr lang="en-US"/>
           </a:p>
@@ -2673,7 +2671,7 @@
             <a:fld id="{1F541AB0-5ECD-4F0C-8435-DFC39302280B}" type="datetimeFigureOut">
               <a:rPr lang="en-US" smtClean="0"/>
               <a:pPr/>
-              <a:t>1/26/2016</a:t>
+              <a:t>2/11/2016</a:t>
             </a:fld>
             <a:endParaRPr lang="en-US"/>
           </a:p>
@@ -2928,7 +2926,7 @@
             <a:fld id="{1F541AB0-5ECD-4F0C-8435-DFC39302280B}" type="datetimeFigureOut">
               <a:rPr lang="en-US" smtClean="0"/>
               <a:pPr/>
-              <a:t>1/26/2016</a:t>
+              <a:t>2/11/2016</a:t>
             </a:fld>
             <a:endParaRPr lang="en-US"/>
           </a:p>
@@ -3143,7 +3141,7 @@
             <a:fld id="{1F541AB0-5ECD-4F0C-8435-DFC39302280B}" type="datetimeFigureOut">
               <a:rPr lang="en-US" smtClean="0"/>
               <a:pPr/>
-              <a:t>1/26/2016</a:t>
+              <a:t>2/11/2016</a:t>
             </a:fld>
             <a:endParaRPr lang="en-US"/>
           </a:p>
@@ -4435,8 +4433,8 @@
         </p:nvCxnSpPr>
         <p:spPr>
           <a:xfrm>
-            <a:off x="3505200" y="2235431"/>
-            <a:ext cx="857250" cy="654335"/>
+            <a:off x="3733800" y="2235431"/>
+            <a:ext cx="628650" cy="654335"/>
           </a:xfrm>
           <a:prstGeom prst="straightConnector1">
             <a:avLst/>
@@ -4471,8 +4469,8 @@
         </p:nvCxnSpPr>
         <p:spPr>
           <a:xfrm>
-            <a:off x="4350958" y="2236623"/>
-            <a:ext cx="765032" cy="582777"/>
+            <a:off x="4572000" y="2235431"/>
+            <a:ext cx="543990" cy="583969"/>
           </a:xfrm>
           <a:prstGeom prst="straightConnector1">
             <a:avLst/>
@@ -7589,221 +7587,6 @@
     <p:extLst>
       <p:ext uri="{BB962C8B-B14F-4D97-AF65-F5344CB8AC3E}">
         <p14:creationId xmlns:p14="http://schemas.microsoft.com/office/powerpoint/2010/main" val="3030015219"/>
-      </p:ext>
-    </p:extLst>
-  </p:cSld>
-  <p:clrMapOvr>
-    <a:masterClrMapping/>
-  </p:clrMapOvr>
-</p:sld>
-</file>
-
-<file path=ppt/slides/slide18.xml><?xml version="1.0" encoding="utf-8"?>
-<p:sld xmlns:a="http://schemas.openxmlformats.org/drawingml/2006/main" xmlns:r="http://schemas.openxmlformats.org/officeDocument/2006/relationships" xmlns:p="http://schemas.openxmlformats.org/presentationml/2006/main">
-  <p:cSld>
-    <p:spTree>
-      <p:nvGrpSpPr>
-        <p:cNvPr id="1" name=""/>
-        <p:cNvGrpSpPr/>
-        <p:nvPr/>
-      </p:nvGrpSpPr>
-      <p:grpSpPr>
-        <a:xfrm>
-          <a:off x="0" y="0"/>
-          <a:ext cx="0" cy="0"/>
-          <a:chOff x="0" y="0"/>
-          <a:chExt cx="0" cy="0"/>
-        </a:xfrm>
-      </p:grpSpPr>
-      <p:sp>
-        <p:nvSpPr>
-          <p:cNvPr id="2" name="Title 1"/>
-          <p:cNvSpPr>
-            <a:spLocks noGrp="1"/>
-          </p:cNvSpPr>
-          <p:nvPr>
-            <p:ph type="title"/>
-          </p:nvPr>
-        </p:nvSpPr>
-        <p:spPr/>
-        <p:txBody>
-          <a:bodyPr>
-            <a:normAutofit fontScale="90000"/>
-          </a:bodyPr>
-          <a:lstStyle/>
-          <a:p>
-            <a:r>
-              <a:rPr lang="en-US" dirty="0" smtClean="0"/>
-              <a:t>Compare Distribution of Source and Sample Data</a:t>
-            </a:r>
-            <a:endParaRPr lang="en-US" dirty="0"/>
-          </a:p>
-        </p:txBody>
-      </p:sp>
-      <p:sp>
-        <p:nvSpPr>
-          <p:cNvPr id="3" name="Content Placeholder 2"/>
-          <p:cNvSpPr>
-            <a:spLocks noGrp="1"/>
-          </p:cNvSpPr>
-          <p:nvPr>
-            <p:ph idx="1"/>
-          </p:nvPr>
-        </p:nvSpPr>
-        <p:spPr>
-          <a:xfrm>
-            <a:off x="457200" y="1524000"/>
-            <a:ext cx="8229600" cy="4815840"/>
-          </a:xfrm>
-        </p:spPr>
-        <p:txBody>
-          <a:bodyPr>
-            <a:normAutofit fontScale="92500" lnSpcReduction="10000"/>
-          </a:bodyPr>
-          <a:lstStyle/>
-          <a:p>
-            <a:r>
-              <a:rPr lang="en-US" dirty="0" smtClean="0"/>
-              <a:t>Example from Beaver Creek, Wyoming</a:t>
-            </a:r>
-          </a:p>
-          <a:p>
-            <a:r>
-              <a:rPr lang="en-US" dirty="0" smtClean="0"/>
-              <a:t>Took point extraction from raster of environmental covariates (All)</a:t>
-            </a:r>
-          </a:p>
-          <a:p>
-            <a:r>
-              <a:rPr lang="en-US" dirty="0" smtClean="0"/>
-              <a:t>Another set of extractions from </a:t>
-            </a:r>
-            <a:r>
-              <a:rPr lang="en-US" dirty="0" err="1" smtClean="0"/>
-              <a:t>accessibl</a:t>
-            </a:r>
-            <a:r>
-              <a:rPr lang="en-US" dirty="0" smtClean="0"/>
-              <a:t> areas (Access)</a:t>
-            </a:r>
-          </a:p>
-          <a:p>
-            <a:r>
-              <a:rPr lang="en-US" dirty="0" smtClean="0"/>
-              <a:t>Finally, a series of nested </a:t>
-            </a:r>
-            <a:r>
-              <a:rPr lang="en-US" dirty="0" err="1" smtClean="0"/>
-              <a:t>cLHS</a:t>
-            </a:r>
-            <a:r>
-              <a:rPr lang="en-US" dirty="0" smtClean="0"/>
-              <a:t> sample locations were drawn from the accessible areas (target)</a:t>
-            </a:r>
-          </a:p>
-          <a:p>
-            <a:pPr marL="0" indent="0">
-              <a:buNone/>
-            </a:pPr>
-            <a:r>
-              <a:rPr lang="en-US" dirty="0">
-                <a:solidFill>
-                  <a:srgbClr val="00B0F0"/>
-                </a:solidFill>
-              </a:rPr>
-              <a:t>https://raw.githubusercontent.com/ncss-tech/stats_for_soil_survey/master/presentations/sampling/pdf_example/target_pdf_rcode.R</a:t>
-            </a:r>
-          </a:p>
-        </p:txBody>
-      </p:sp>
-    </p:spTree>
-    <p:extLst>
-      <p:ext uri="{BB962C8B-B14F-4D97-AF65-F5344CB8AC3E}">
-        <p14:creationId xmlns:p14="http://schemas.microsoft.com/office/powerpoint/2010/main" val="4239267895"/>
-      </p:ext>
-    </p:extLst>
-  </p:cSld>
-  <p:clrMapOvr>
-    <a:masterClrMapping/>
-  </p:clrMapOvr>
-</p:sld>
-</file>
-
-<file path=ppt/slides/slide19.xml><?xml version="1.0" encoding="utf-8"?>
-<p:sld xmlns:a="http://schemas.openxmlformats.org/drawingml/2006/main" xmlns:r="http://schemas.openxmlformats.org/officeDocument/2006/relationships" xmlns:p="http://schemas.openxmlformats.org/presentationml/2006/main">
-  <p:cSld>
-    <p:spTree>
-      <p:nvGrpSpPr>
-        <p:cNvPr id="1" name=""/>
-        <p:cNvGrpSpPr/>
-        <p:nvPr/>
-      </p:nvGrpSpPr>
-      <p:grpSpPr>
-        <a:xfrm>
-          <a:off x="0" y="0"/>
-          <a:ext cx="0" cy="0"/>
-          <a:chOff x="0" y="0"/>
-          <a:chExt cx="0" cy="0"/>
-        </a:xfrm>
-      </p:grpSpPr>
-      <p:sp>
-        <p:nvSpPr>
-          <p:cNvPr id="2" name="Title 1"/>
-          <p:cNvSpPr>
-            <a:spLocks noGrp="1"/>
-          </p:cNvSpPr>
-          <p:nvPr>
-            <p:ph type="title"/>
-          </p:nvPr>
-        </p:nvSpPr>
-        <p:spPr/>
-        <p:txBody>
-          <a:bodyPr/>
-          <a:lstStyle/>
-          <a:p>
-            <a:r>
-              <a:rPr lang="en-US" dirty="0" smtClean="0"/>
-              <a:t>Take the result of step 4</a:t>
-            </a:r>
-            <a:endParaRPr lang="en-US" dirty="0"/>
-          </a:p>
-        </p:txBody>
-      </p:sp>
-      <p:sp>
-        <p:nvSpPr>
-          <p:cNvPr id="3" name="Content Placeholder 2"/>
-          <p:cNvSpPr>
-            <a:spLocks noGrp="1"/>
-          </p:cNvSpPr>
-          <p:nvPr>
-            <p:ph idx="1"/>
-          </p:nvPr>
-        </p:nvSpPr>
-        <p:spPr/>
-        <p:txBody>
-          <a:bodyPr/>
-          <a:lstStyle/>
-          <a:p>
-            <a:r>
-              <a:rPr lang="en-US" dirty="0" smtClean="0"/>
-              <a:t>Can you modify the </a:t>
-            </a:r>
-            <a:r>
-              <a:rPr lang="en-US" dirty="0" err="1" smtClean="0"/>
-              <a:t>WY_beaver</a:t>
-            </a:r>
-            <a:r>
-              <a:rPr lang="en-US" dirty="0" smtClean="0"/>
-              <a:t> creek example to display the pdf of one ancillary variable for the entire dataset and for the selected sample set? </a:t>
-            </a:r>
-            <a:endParaRPr lang="en-US" dirty="0"/>
-          </a:p>
-        </p:txBody>
-      </p:sp>
-    </p:spTree>
-    <p:extLst>
-      <p:ext uri="{BB962C8B-B14F-4D97-AF65-F5344CB8AC3E}">
-        <p14:creationId xmlns:p14="http://schemas.microsoft.com/office/powerpoint/2010/main" val="1355880379"/>
       </p:ext>
     </p:extLst>
   </p:cSld>
@@ -9399,7 +9182,23 @@
           <a:p>
             <a:r>
               <a:rPr lang="en-US" sz="2800" dirty="0" smtClean="0"/>
-              <a:t>Data from the samples of must contain data values that match the values of the covariate layers, since the sample points will serve as training data for modelling work</a:t>
+              <a:t>Data </a:t>
+            </a:r>
+            <a:r>
+              <a:rPr lang="en-US" sz="2800" dirty="0" smtClean="0"/>
+              <a:t>values from </a:t>
+            </a:r>
+            <a:r>
+              <a:rPr lang="en-US" sz="2800" dirty="0" smtClean="0"/>
+              <a:t>the samples </a:t>
+            </a:r>
+            <a:r>
+              <a:rPr lang="en-US" sz="2800" dirty="0" smtClean="0"/>
+              <a:t>must match </a:t>
+            </a:r>
+            <a:r>
+              <a:rPr lang="en-US" sz="2800" dirty="0" smtClean="0"/>
+              <a:t>the values of the covariate layers, since the sample points will serve as training data for modelling work</a:t>
             </a:r>
           </a:p>
           <a:p>

</xml_diff>